<commit_message>
simulation code and plots
</commit_message>
<xml_diff>
--- a/someplotz.pptx
+++ b/someplotz.pptx
@@ -5,20 +5,24 @@
     <p:sldMasterId id="2147483648" r:id="rId1"/>
   </p:sldMasterIdLst>
   <p:notesMasterIdLst>
-    <p:notesMasterId r:id="rId13"/>
+    <p:notesMasterId r:id="rId17"/>
   </p:notesMasterIdLst>
   <p:sldIdLst>
-    <p:sldId id="262" r:id="rId2"/>
-    <p:sldId id="257" r:id="rId3"/>
-    <p:sldId id="263" r:id="rId4"/>
-    <p:sldId id="258" r:id="rId5"/>
-    <p:sldId id="264" r:id="rId6"/>
-    <p:sldId id="259" r:id="rId7"/>
-    <p:sldId id="265" r:id="rId8"/>
-    <p:sldId id="260" r:id="rId9"/>
-    <p:sldId id="266" r:id="rId10"/>
-    <p:sldId id="261" r:id="rId11"/>
-    <p:sldId id="267" r:id="rId12"/>
+    <p:sldId id="257" r:id="rId2"/>
+    <p:sldId id="262" r:id="rId3"/>
+    <p:sldId id="267" r:id="rId4"/>
+    <p:sldId id="259" r:id="rId5"/>
+    <p:sldId id="263" r:id="rId6"/>
+    <p:sldId id="268" r:id="rId7"/>
+    <p:sldId id="258" r:id="rId8"/>
+    <p:sldId id="264" r:id="rId9"/>
+    <p:sldId id="269" r:id="rId10"/>
+    <p:sldId id="260" r:id="rId11"/>
+    <p:sldId id="265" r:id="rId12"/>
+    <p:sldId id="270" r:id="rId13"/>
+    <p:sldId id="261" r:id="rId14"/>
+    <p:sldId id="266" r:id="rId15"/>
+    <p:sldId id="271" r:id="rId16"/>
   </p:sldIdLst>
   <p:sldSz cx="12192000" cy="6858000"/>
   <p:notesSz cx="6858000" cy="9144000"/>
@@ -3693,7 +3697,7 @@
           <p:cNvPr id="2" name="Title 1">
             <a:extLst>
               <a:ext uri="{FF2B5EF4-FFF2-40B4-BE49-F238E27FC236}">
-                <a16:creationId xmlns:a16="http://schemas.microsoft.com/office/drawing/2014/main" id="{3A0FF5E8-7744-5849-89B9-AF3809C2C82D}"/>
+                <a16:creationId xmlns:a16="http://schemas.microsoft.com/office/drawing/2014/main" id="{707E95A5-FCA6-244F-A8CD-5BEE9555A01E}"/>
               </a:ext>
             </a:extLst>
           </p:cNvPr>
@@ -3711,7 +3715,7 @@
           <a:p>
             <a:r>
               <a:rPr lang="en-US" dirty="0"/>
-              <a:t>Deterministic </a:t>
+              <a:t>Tau and Alpha, R0=1.3</a:t>
             </a:r>
           </a:p>
         </p:txBody>
@@ -3721,7 +3725,7 @@
           <p:cNvPr id="5" name="Content Placeholder 4">
             <a:extLst>
               <a:ext uri="{FF2B5EF4-FFF2-40B4-BE49-F238E27FC236}">
-                <a16:creationId xmlns:a16="http://schemas.microsoft.com/office/drawing/2014/main" id="{A5B0D010-7E5C-EF45-996F-4E9DAFAFCD43}"/>
+                <a16:creationId xmlns:a16="http://schemas.microsoft.com/office/drawing/2014/main" id="{ECB60DBF-380B-A74F-BC09-7759F34C0BD3}"/>
               </a:ext>
             </a:extLst>
           </p:cNvPr>
@@ -3740,15 +3744,15 @@
         </p:blipFill>
         <p:spPr>
           <a:xfrm>
-            <a:off x="2641599" y="1439969"/>
-            <a:ext cx="6316133" cy="5052906"/>
+            <a:off x="1981200" y="2172494"/>
+            <a:ext cx="8229600" cy="3657600"/>
           </a:xfrm>
         </p:spPr>
       </p:pic>
     </p:spTree>
     <p:extLst>
       <p:ext uri="{BB962C8B-B14F-4D97-AF65-F5344CB8AC3E}">
-        <p14:creationId xmlns:p14="http://schemas.microsoft.com/office/powerpoint/2010/main" val="973603343"/>
+        <p14:creationId xmlns:p14="http://schemas.microsoft.com/office/powerpoint/2010/main" val="1143181785"/>
       </p:ext>
     </p:extLst>
   </p:cSld>
@@ -3780,7 +3784,7 @@
           <p:cNvPr id="2" name="Title 1">
             <a:extLst>
               <a:ext uri="{FF2B5EF4-FFF2-40B4-BE49-F238E27FC236}">
-                <a16:creationId xmlns:a16="http://schemas.microsoft.com/office/drawing/2014/main" id="{A6BB9F04-4E4F-6C42-BE06-86C2E40F05C9}"/>
+                <a16:creationId xmlns:a16="http://schemas.microsoft.com/office/drawing/2014/main" id="{5B062E5D-5DCF-A845-BDDA-1B5FD395201F}"/>
               </a:ext>
             </a:extLst>
           </p:cNvPr>
@@ -3798,15 +3802,7 @@
           <a:p>
             <a:r>
               <a:rPr lang="en-US" dirty="0"/>
-              <a:t>Contact and Tau, </a:t>
-            </a:r>
-            <a:r>
-              <a:rPr lang="en-US" dirty="0" err="1"/>
-              <a:t>sd</a:t>
-            </a:r>
-            <a:r>
-              <a:rPr lang="en-US" dirty="0"/>
-              <a:t>=.1</a:t>
+              <a:t>Contact and Alpha, R0=1.3</a:t>
             </a:r>
           </a:p>
         </p:txBody>
@@ -3816,7 +3812,7 @@
           <p:cNvPr id="5" name="Content Placeholder 4">
             <a:extLst>
               <a:ext uri="{FF2B5EF4-FFF2-40B4-BE49-F238E27FC236}">
-                <a16:creationId xmlns:a16="http://schemas.microsoft.com/office/drawing/2014/main" id="{9F8FE9A8-4A85-D045-98E8-9078FB8B20AC}"/>
+                <a16:creationId xmlns:a16="http://schemas.microsoft.com/office/drawing/2014/main" id="{A25EF7D3-03CE-B248-A8FB-3AB2548A18C3}"/>
               </a:ext>
             </a:extLst>
           </p:cNvPr>
@@ -3835,15 +3831,15 @@
         </p:blipFill>
         <p:spPr>
           <a:xfrm>
-            <a:off x="2438400" y="2172494"/>
-            <a:ext cx="7315200" cy="3657600"/>
+            <a:off x="1981200" y="2172494"/>
+            <a:ext cx="8229600" cy="3657600"/>
           </a:xfrm>
         </p:spPr>
       </p:pic>
     </p:spTree>
     <p:extLst>
       <p:ext uri="{BB962C8B-B14F-4D97-AF65-F5344CB8AC3E}">
-        <p14:creationId xmlns:p14="http://schemas.microsoft.com/office/powerpoint/2010/main" val="2503273854"/>
+        <p14:creationId xmlns:p14="http://schemas.microsoft.com/office/powerpoint/2010/main" val="3008140729"/>
       </p:ext>
     </p:extLst>
   </p:cSld>
@@ -3875,7 +3871,7 @@
           <p:cNvPr id="2" name="Title 1">
             <a:extLst>
               <a:ext uri="{FF2B5EF4-FFF2-40B4-BE49-F238E27FC236}">
-                <a16:creationId xmlns:a16="http://schemas.microsoft.com/office/drawing/2014/main" id="{C0812A06-C09F-0A49-BBD0-999ED3716D06}"/>
+                <a16:creationId xmlns:a16="http://schemas.microsoft.com/office/drawing/2014/main" id="{850218F6-0458-0843-8207-012624AF630A}"/>
               </a:ext>
             </a:extLst>
           </p:cNvPr>
@@ -3893,15 +3889,7 @@
           <a:p>
             <a:r>
               <a:rPr lang="en-US" dirty="0"/>
-              <a:t>Contact and Tau, </a:t>
-            </a:r>
-            <a:r>
-              <a:rPr lang="en-US" dirty="0" err="1"/>
-              <a:t>sd</a:t>
-            </a:r>
-            <a:r>
-              <a:rPr lang="en-US" dirty="0"/>
-              <a:t>=.25</a:t>
+              <a:t>Contact and Alpha, R0=2.5</a:t>
             </a:r>
           </a:p>
         </p:txBody>
@@ -3911,7 +3899,7 @@
           <p:cNvPr id="5" name="Content Placeholder 4">
             <a:extLst>
               <a:ext uri="{FF2B5EF4-FFF2-40B4-BE49-F238E27FC236}">
-                <a16:creationId xmlns:a16="http://schemas.microsoft.com/office/drawing/2014/main" id="{8AFA50CA-AC39-514E-8CDF-D0187CFB257D}"/>
+                <a16:creationId xmlns:a16="http://schemas.microsoft.com/office/drawing/2014/main" id="{1D9E2604-DB20-8B47-92F0-B55D4367D621}"/>
               </a:ext>
             </a:extLst>
           </p:cNvPr>
@@ -3930,15 +3918,363 @@
         </p:blipFill>
         <p:spPr>
           <a:xfrm>
-            <a:off x="2438400" y="2172494"/>
-            <a:ext cx="7315200" cy="3657600"/>
+            <a:off x="1981200" y="2172494"/>
+            <a:ext cx="8229600" cy="3657600"/>
           </a:xfrm>
         </p:spPr>
       </p:pic>
     </p:spTree>
     <p:extLst>
       <p:ext uri="{BB962C8B-B14F-4D97-AF65-F5344CB8AC3E}">
-        <p14:creationId xmlns:p14="http://schemas.microsoft.com/office/powerpoint/2010/main" val="2141485482"/>
+        <p14:creationId xmlns:p14="http://schemas.microsoft.com/office/powerpoint/2010/main" val="195478028"/>
+      </p:ext>
+    </p:extLst>
+  </p:cSld>
+  <p:clrMapOvr>
+    <a:masterClrMapping/>
+  </p:clrMapOvr>
+</p:sld>
+</file>
+
+<file path=ppt/slides/slide12.xml><?xml version="1.0" encoding="utf-8"?>
+<p:sld xmlns:a="http://schemas.openxmlformats.org/drawingml/2006/main" xmlns:r="http://schemas.openxmlformats.org/officeDocument/2006/relationships" xmlns:p="http://schemas.openxmlformats.org/presentationml/2006/main">
+  <p:cSld>
+    <p:spTree>
+      <p:nvGrpSpPr>
+        <p:cNvPr id="1" name=""/>
+        <p:cNvGrpSpPr/>
+        <p:nvPr/>
+      </p:nvGrpSpPr>
+      <p:grpSpPr>
+        <a:xfrm>
+          <a:off x="0" y="0"/>
+          <a:ext cx="0" cy="0"/>
+          <a:chOff x="0" y="0"/>
+          <a:chExt cx="0" cy="0"/>
+        </a:xfrm>
+      </p:grpSpPr>
+      <p:sp>
+        <p:nvSpPr>
+          <p:cNvPr id="2" name="Title 1">
+            <a:extLst>
+              <a:ext uri="{FF2B5EF4-FFF2-40B4-BE49-F238E27FC236}">
+                <a16:creationId xmlns:a16="http://schemas.microsoft.com/office/drawing/2014/main" id="{F3642E09-6EB3-2C40-9ED8-F6FBC2537FAA}"/>
+              </a:ext>
+            </a:extLst>
+          </p:cNvPr>
+          <p:cNvSpPr>
+            <a:spLocks noGrp="1"/>
+          </p:cNvSpPr>
+          <p:nvPr>
+            <p:ph type="title"/>
+          </p:nvPr>
+        </p:nvSpPr>
+        <p:spPr/>
+        <p:txBody>
+          <a:bodyPr/>
+          <a:lstStyle/>
+          <a:p>
+            <a:r>
+              <a:rPr lang="en-US" dirty="0"/>
+              <a:t>Contact and Alpha, R0=3.5</a:t>
+            </a:r>
+          </a:p>
+        </p:txBody>
+      </p:sp>
+      <p:pic>
+        <p:nvPicPr>
+          <p:cNvPr id="5" name="Content Placeholder 4">
+            <a:extLst>
+              <a:ext uri="{FF2B5EF4-FFF2-40B4-BE49-F238E27FC236}">
+                <a16:creationId xmlns:a16="http://schemas.microsoft.com/office/drawing/2014/main" id="{254E1A07-65A8-7C4A-82D1-E79204918209}"/>
+              </a:ext>
+            </a:extLst>
+          </p:cNvPr>
+          <p:cNvPicPr>
+            <a:picLocks noGrp="1" noChangeAspect="1"/>
+          </p:cNvPicPr>
+          <p:nvPr>
+            <p:ph idx="1"/>
+          </p:nvPr>
+        </p:nvPicPr>
+        <p:blipFill>
+          <a:blip r:embed="rId2"/>
+          <a:stretch>
+            <a:fillRect/>
+          </a:stretch>
+        </p:blipFill>
+        <p:spPr>
+          <a:xfrm>
+            <a:off x="1981200" y="2172494"/>
+            <a:ext cx="8229600" cy="3657600"/>
+          </a:xfrm>
+        </p:spPr>
+      </p:pic>
+    </p:spTree>
+    <p:extLst>
+      <p:ext uri="{BB962C8B-B14F-4D97-AF65-F5344CB8AC3E}">
+        <p14:creationId xmlns:p14="http://schemas.microsoft.com/office/powerpoint/2010/main" val="1806080107"/>
+      </p:ext>
+    </p:extLst>
+  </p:cSld>
+  <p:clrMapOvr>
+    <a:masterClrMapping/>
+  </p:clrMapOvr>
+</p:sld>
+</file>
+
+<file path=ppt/slides/slide13.xml><?xml version="1.0" encoding="utf-8"?>
+<p:sld xmlns:a="http://schemas.openxmlformats.org/drawingml/2006/main" xmlns:r="http://schemas.openxmlformats.org/officeDocument/2006/relationships" xmlns:p="http://schemas.openxmlformats.org/presentationml/2006/main">
+  <p:cSld>
+    <p:spTree>
+      <p:nvGrpSpPr>
+        <p:cNvPr id="1" name=""/>
+        <p:cNvGrpSpPr/>
+        <p:nvPr/>
+      </p:nvGrpSpPr>
+      <p:grpSpPr>
+        <a:xfrm>
+          <a:off x="0" y="0"/>
+          <a:ext cx="0" cy="0"/>
+          <a:chOff x="0" y="0"/>
+          <a:chExt cx="0" cy="0"/>
+        </a:xfrm>
+      </p:grpSpPr>
+      <p:sp>
+        <p:nvSpPr>
+          <p:cNvPr id="2" name="Title 1">
+            <a:extLst>
+              <a:ext uri="{FF2B5EF4-FFF2-40B4-BE49-F238E27FC236}">
+                <a16:creationId xmlns:a16="http://schemas.microsoft.com/office/drawing/2014/main" id="{124D5740-1292-2D41-9D6B-684E4F773D1A}"/>
+              </a:ext>
+            </a:extLst>
+          </p:cNvPr>
+          <p:cNvSpPr>
+            <a:spLocks noGrp="1"/>
+          </p:cNvSpPr>
+          <p:nvPr>
+            <p:ph type="title"/>
+          </p:nvPr>
+        </p:nvSpPr>
+        <p:spPr/>
+        <p:txBody>
+          <a:bodyPr/>
+          <a:lstStyle/>
+          <a:p>
+            <a:r>
+              <a:rPr lang="en-US" dirty="0"/>
+              <a:t>Contact and Tau, R0=1.3</a:t>
+            </a:r>
+          </a:p>
+        </p:txBody>
+      </p:sp>
+      <p:pic>
+        <p:nvPicPr>
+          <p:cNvPr id="5" name="Content Placeholder 4">
+            <a:extLst>
+              <a:ext uri="{FF2B5EF4-FFF2-40B4-BE49-F238E27FC236}">
+                <a16:creationId xmlns:a16="http://schemas.microsoft.com/office/drawing/2014/main" id="{CDCD91F9-BBC3-1347-9EC5-8E05807EB308}"/>
+              </a:ext>
+            </a:extLst>
+          </p:cNvPr>
+          <p:cNvPicPr>
+            <a:picLocks noGrp="1" noChangeAspect="1"/>
+          </p:cNvPicPr>
+          <p:nvPr>
+            <p:ph idx="1"/>
+          </p:nvPr>
+        </p:nvPicPr>
+        <p:blipFill>
+          <a:blip r:embed="rId2"/>
+          <a:stretch>
+            <a:fillRect/>
+          </a:stretch>
+        </p:blipFill>
+        <p:spPr>
+          <a:xfrm>
+            <a:off x="1981200" y="2172494"/>
+            <a:ext cx="8229600" cy="3657600"/>
+          </a:xfrm>
+        </p:spPr>
+      </p:pic>
+    </p:spTree>
+    <p:extLst>
+      <p:ext uri="{BB962C8B-B14F-4D97-AF65-F5344CB8AC3E}">
+        <p14:creationId xmlns:p14="http://schemas.microsoft.com/office/powerpoint/2010/main" val="372636392"/>
+      </p:ext>
+    </p:extLst>
+  </p:cSld>
+  <p:clrMapOvr>
+    <a:masterClrMapping/>
+  </p:clrMapOvr>
+</p:sld>
+</file>
+
+<file path=ppt/slides/slide14.xml><?xml version="1.0" encoding="utf-8"?>
+<p:sld xmlns:a="http://schemas.openxmlformats.org/drawingml/2006/main" xmlns:r="http://schemas.openxmlformats.org/officeDocument/2006/relationships" xmlns:p="http://schemas.openxmlformats.org/presentationml/2006/main">
+  <p:cSld>
+    <p:spTree>
+      <p:nvGrpSpPr>
+        <p:cNvPr id="1" name=""/>
+        <p:cNvGrpSpPr/>
+        <p:nvPr/>
+      </p:nvGrpSpPr>
+      <p:grpSpPr>
+        <a:xfrm>
+          <a:off x="0" y="0"/>
+          <a:ext cx="0" cy="0"/>
+          <a:chOff x="0" y="0"/>
+          <a:chExt cx="0" cy="0"/>
+        </a:xfrm>
+      </p:grpSpPr>
+      <p:sp>
+        <p:nvSpPr>
+          <p:cNvPr id="2" name="Title 1">
+            <a:extLst>
+              <a:ext uri="{FF2B5EF4-FFF2-40B4-BE49-F238E27FC236}">
+                <a16:creationId xmlns:a16="http://schemas.microsoft.com/office/drawing/2014/main" id="{BB9E55FF-0013-9647-85A2-A891AA7EA7D2}"/>
+              </a:ext>
+            </a:extLst>
+          </p:cNvPr>
+          <p:cNvSpPr>
+            <a:spLocks noGrp="1"/>
+          </p:cNvSpPr>
+          <p:nvPr>
+            <p:ph type="title"/>
+          </p:nvPr>
+        </p:nvSpPr>
+        <p:spPr/>
+        <p:txBody>
+          <a:bodyPr/>
+          <a:lstStyle/>
+          <a:p>
+            <a:r>
+              <a:rPr lang="en-US" dirty="0"/>
+              <a:t>Contact and Tau, R0=2.5</a:t>
+            </a:r>
+          </a:p>
+        </p:txBody>
+      </p:sp>
+      <p:pic>
+        <p:nvPicPr>
+          <p:cNvPr id="5" name="Content Placeholder 4">
+            <a:extLst>
+              <a:ext uri="{FF2B5EF4-FFF2-40B4-BE49-F238E27FC236}">
+                <a16:creationId xmlns:a16="http://schemas.microsoft.com/office/drawing/2014/main" id="{9873AB9E-2623-4D4E-893E-B7C58B0155F1}"/>
+              </a:ext>
+            </a:extLst>
+          </p:cNvPr>
+          <p:cNvPicPr>
+            <a:picLocks noGrp="1" noChangeAspect="1"/>
+          </p:cNvPicPr>
+          <p:nvPr>
+            <p:ph idx="1"/>
+          </p:nvPr>
+        </p:nvPicPr>
+        <p:blipFill>
+          <a:blip r:embed="rId2"/>
+          <a:stretch>
+            <a:fillRect/>
+          </a:stretch>
+        </p:blipFill>
+        <p:spPr>
+          <a:xfrm>
+            <a:off x="1981200" y="2172494"/>
+            <a:ext cx="8229600" cy="3657600"/>
+          </a:xfrm>
+        </p:spPr>
+      </p:pic>
+    </p:spTree>
+    <p:extLst>
+      <p:ext uri="{BB962C8B-B14F-4D97-AF65-F5344CB8AC3E}">
+        <p14:creationId xmlns:p14="http://schemas.microsoft.com/office/powerpoint/2010/main" val="718694865"/>
+      </p:ext>
+    </p:extLst>
+  </p:cSld>
+  <p:clrMapOvr>
+    <a:masterClrMapping/>
+  </p:clrMapOvr>
+</p:sld>
+</file>
+
+<file path=ppt/slides/slide15.xml><?xml version="1.0" encoding="utf-8"?>
+<p:sld xmlns:a="http://schemas.openxmlformats.org/drawingml/2006/main" xmlns:r="http://schemas.openxmlformats.org/officeDocument/2006/relationships" xmlns:p="http://schemas.openxmlformats.org/presentationml/2006/main">
+  <p:cSld>
+    <p:spTree>
+      <p:nvGrpSpPr>
+        <p:cNvPr id="1" name=""/>
+        <p:cNvGrpSpPr/>
+        <p:nvPr/>
+      </p:nvGrpSpPr>
+      <p:grpSpPr>
+        <a:xfrm>
+          <a:off x="0" y="0"/>
+          <a:ext cx="0" cy="0"/>
+          <a:chOff x="0" y="0"/>
+          <a:chExt cx="0" cy="0"/>
+        </a:xfrm>
+      </p:grpSpPr>
+      <p:sp>
+        <p:nvSpPr>
+          <p:cNvPr id="2" name="Title 1">
+            <a:extLst>
+              <a:ext uri="{FF2B5EF4-FFF2-40B4-BE49-F238E27FC236}">
+                <a16:creationId xmlns:a16="http://schemas.microsoft.com/office/drawing/2014/main" id="{117BF2D0-65F6-054D-B990-4605F9815252}"/>
+              </a:ext>
+            </a:extLst>
+          </p:cNvPr>
+          <p:cNvSpPr>
+            <a:spLocks noGrp="1"/>
+          </p:cNvSpPr>
+          <p:nvPr>
+            <p:ph type="title"/>
+          </p:nvPr>
+        </p:nvSpPr>
+        <p:spPr/>
+        <p:txBody>
+          <a:bodyPr/>
+          <a:lstStyle/>
+          <a:p>
+            <a:r>
+              <a:rPr lang="en-US" dirty="0"/>
+              <a:t>Contact and Tau, R0=3.5</a:t>
+            </a:r>
+          </a:p>
+        </p:txBody>
+      </p:sp>
+      <p:pic>
+        <p:nvPicPr>
+          <p:cNvPr id="5" name="Content Placeholder 4">
+            <a:extLst>
+              <a:ext uri="{FF2B5EF4-FFF2-40B4-BE49-F238E27FC236}">
+                <a16:creationId xmlns:a16="http://schemas.microsoft.com/office/drawing/2014/main" id="{12BC6280-F5CA-F74D-92C7-D92B5344FB8E}"/>
+              </a:ext>
+            </a:extLst>
+          </p:cNvPr>
+          <p:cNvPicPr>
+            <a:picLocks noGrp="1" noChangeAspect="1"/>
+          </p:cNvPicPr>
+          <p:nvPr>
+            <p:ph idx="1"/>
+          </p:nvPr>
+        </p:nvPicPr>
+        <p:blipFill>
+          <a:blip r:embed="rId2"/>
+          <a:stretch>
+            <a:fillRect/>
+          </a:stretch>
+        </p:blipFill>
+        <p:spPr>
+          <a:xfrm>
+            <a:off x="1981200" y="2172494"/>
+            <a:ext cx="8229600" cy="3657600"/>
+          </a:xfrm>
+        </p:spPr>
+      </p:pic>
+    </p:spTree>
+    <p:extLst>
+      <p:ext uri="{BB962C8B-B14F-4D97-AF65-F5344CB8AC3E}">
+        <p14:creationId xmlns:p14="http://schemas.microsoft.com/office/powerpoint/2010/main" val="3939406445"/>
       </p:ext>
     </p:extLst>
   </p:cSld>
@@ -3970,7 +4306,7 @@
           <p:cNvPr id="2" name="Title 1">
             <a:extLst>
               <a:ext uri="{FF2B5EF4-FFF2-40B4-BE49-F238E27FC236}">
-                <a16:creationId xmlns:a16="http://schemas.microsoft.com/office/drawing/2014/main" id="{48266012-107B-3747-9353-390FEDF8A3FB}"/>
+                <a16:creationId xmlns:a16="http://schemas.microsoft.com/office/drawing/2014/main" id="{73425639-A69D-BE44-9B91-03CB6FCFD847}"/>
               </a:ext>
             </a:extLst>
           </p:cNvPr>
@@ -3988,25 +4324,17 @@
           <a:p>
             <a:r>
               <a:rPr lang="en-US" dirty="0"/>
-              <a:t>Tau and Alpha, </a:t>
-            </a:r>
-            <a:r>
-              <a:rPr lang="en-US" dirty="0" err="1"/>
-              <a:t>sd</a:t>
-            </a:r>
-            <a:r>
-              <a:rPr lang="en-US" dirty="0"/>
-              <a:t>=.1</a:t>
+              <a:t>Tau and Alpha, R0=2.5</a:t>
             </a:r>
           </a:p>
         </p:txBody>
       </p:sp>
       <p:pic>
         <p:nvPicPr>
-          <p:cNvPr id="10" name="Content Placeholder 9">
-            <a:extLst>
-              <a:ext uri="{FF2B5EF4-FFF2-40B4-BE49-F238E27FC236}">
-                <a16:creationId xmlns:a16="http://schemas.microsoft.com/office/drawing/2014/main" id="{1092F80F-898D-E049-B32C-D14B0F2AB3E7}"/>
+          <p:cNvPr id="9" name="Content Placeholder 8">
+            <a:extLst>
+              <a:ext uri="{FF2B5EF4-FFF2-40B4-BE49-F238E27FC236}">
+                <a16:creationId xmlns:a16="http://schemas.microsoft.com/office/drawing/2014/main" id="{2AAF9F94-369A-D643-B8E2-F27EF51F90E7}"/>
               </a:ext>
             </a:extLst>
           </p:cNvPr>
@@ -4025,15 +4353,15 @@
         </p:blipFill>
         <p:spPr>
           <a:xfrm>
-            <a:off x="2438400" y="2172494"/>
-            <a:ext cx="7315200" cy="3657600"/>
+            <a:off x="1981200" y="2172494"/>
+            <a:ext cx="8229600" cy="3657600"/>
           </a:xfrm>
         </p:spPr>
       </p:pic>
     </p:spTree>
     <p:extLst>
       <p:ext uri="{BB962C8B-B14F-4D97-AF65-F5344CB8AC3E}">
-        <p14:creationId xmlns:p14="http://schemas.microsoft.com/office/powerpoint/2010/main" val="463706915"/>
+        <p14:creationId xmlns:p14="http://schemas.microsoft.com/office/powerpoint/2010/main" val="2516940154"/>
       </p:ext>
     </p:extLst>
   </p:cSld>
@@ -4065,7 +4393,7 @@
           <p:cNvPr id="2" name="Title 1">
             <a:extLst>
               <a:ext uri="{FF2B5EF4-FFF2-40B4-BE49-F238E27FC236}">
-                <a16:creationId xmlns:a16="http://schemas.microsoft.com/office/drawing/2014/main" id="{DCC9D899-5728-E44B-875F-A20D507691F8}"/>
+                <a16:creationId xmlns:a16="http://schemas.microsoft.com/office/drawing/2014/main" id="{0D991640-2C93-7E41-B1E6-C1EB0E54E361}"/>
               </a:ext>
             </a:extLst>
           </p:cNvPr>
@@ -4083,15 +4411,7 @@
           <a:p>
             <a:r>
               <a:rPr lang="en-US" dirty="0"/>
-              <a:t>Tau and Alpha, </a:t>
-            </a:r>
-            <a:r>
-              <a:rPr lang="en-US" dirty="0" err="1"/>
-              <a:t>sd</a:t>
-            </a:r>
-            <a:r>
-              <a:rPr lang="en-US" dirty="0"/>
-              <a:t>=.25</a:t>
+              <a:t>Tau and Alpha, R0=3.5</a:t>
             </a:r>
           </a:p>
         </p:txBody>
@@ -4101,7 +4421,7 @@
           <p:cNvPr id="5" name="Content Placeholder 4">
             <a:extLst>
               <a:ext uri="{FF2B5EF4-FFF2-40B4-BE49-F238E27FC236}">
-                <a16:creationId xmlns:a16="http://schemas.microsoft.com/office/drawing/2014/main" id="{C117F51B-B978-4A44-87A7-5762B3DC0A6A}"/>
+                <a16:creationId xmlns:a16="http://schemas.microsoft.com/office/drawing/2014/main" id="{E3ECD071-C881-524D-BA81-45E033337914}"/>
               </a:ext>
             </a:extLst>
           </p:cNvPr>
@@ -4120,15 +4440,15 @@
         </p:blipFill>
         <p:spPr>
           <a:xfrm>
-            <a:off x="2438400" y="2172494"/>
-            <a:ext cx="7315200" cy="3657600"/>
+            <a:off x="1981200" y="2172494"/>
+            <a:ext cx="8229600" cy="3657600"/>
           </a:xfrm>
         </p:spPr>
       </p:pic>
     </p:spTree>
     <p:extLst>
       <p:ext uri="{BB962C8B-B14F-4D97-AF65-F5344CB8AC3E}">
-        <p14:creationId xmlns:p14="http://schemas.microsoft.com/office/powerpoint/2010/main" val="570909315"/>
+        <p14:creationId xmlns:p14="http://schemas.microsoft.com/office/powerpoint/2010/main" val="3086886976"/>
       </p:ext>
     </p:extLst>
   </p:cSld>
@@ -4160,7 +4480,7 @@
           <p:cNvPr id="2" name="Title 1">
             <a:extLst>
               <a:ext uri="{FF2B5EF4-FFF2-40B4-BE49-F238E27FC236}">
-                <a16:creationId xmlns:a16="http://schemas.microsoft.com/office/drawing/2014/main" id="{4BE6C3A7-30F0-304F-B274-935AAAF4DEF1}"/>
+                <a16:creationId xmlns:a16="http://schemas.microsoft.com/office/drawing/2014/main" id="{6A6E7F02-87E1-2B45-B7A2-00E14078A407}"/>
               </a:ext>
             </a:extLst>
           </p:cNvPr>
@@ -4178,15 +4498,7 @@
           <a:p>
             <a:r>
               <a:rPr lang="en-US" dirty="0"/>
-              <a:t>Tau and Gamma, </a:t>
-            </a:r>
-            <a:r>
-              <a:rPr lang="en-US" dirty="0" err="1"/>
-              <a:t>sd</a:t>
-            </a:r>
-            <a:r>
-              <a:rPr lang="en-US" dirty="0"/>
-              <a:t>=.1</a:t>
+              <a:t>Tau and Gamma, R0=1.3</a:t>
             </a:r>
           </a:p>
         </p:txBody>
@@ -4196,7 +4508,7 @@
           <p:cNvPr id="5" name="Content Placeholder 4">
             <a:extLst>
               <a:ext uri="{FF2B5EF4-FFF2-40B4-BE49-F238E27FC236}">
-                <a16:creationId xmlns:a16="http://schemas.microsoft.com/office/drawing/2014/main" id="{25A86C9A-CAC8-8F48-A396-459DEED99A54}"/>
+                <a16:creationId xmlns:a16="http://schemas.microsoft.com/office/drawing/2014/main" id="{83C41838-B624-6C49-9272-D7A45B159B72}"/>
               </a:ext>
             </a:extLst>
           </p:cNvPr>
@@ -4215,15 +4527,15 @@
         </p:blipFill>
         <p:spPr>
           <a:xfrm>
-            <a:off x="2438400" y="2172494"/>
-            <a:ext cx="7315200" cy="3657600"/>
+            <a:off x="1981200" y="2172494"/>
+            <a:ext cx="8229600" cy="3657600"/>
           </a:xfrm>
         </p:spPr>
       </p:pic>
     </p:spTree>
     <p:extLst>
       <p:ext uri="{BB962C8B-B14F-4D97-AF65-F5344CB8AC3E}">
-        <p14:creationId xmlns:p14="http://schemas.microsoft.com/office/powerpoint/2010/main" val="1370602874"/>
+        <p14:creationId xmlns:p14="http://schemas.microsoft.com/office/powerpoint/2010/main" val="4218143306"/>
       </p:ext>
     </p:extLst>
   </p:cSld>
@@ -4255,7 +4567,7 @@
           <p:cNvPr id="2" name="Title 1">
             <a:extLst>
               <a:ext uri="{FF2B5EF4-FFF2-40B4-BE49-F238E27FC236}">
-                <a16:creationId xmlns:a16="http://schemas.microsoft.com/office/drawing/2014/main" id="{42257C35-973F-B84D-8DE7-8A9784F04C5D}"/>
+                <a16:creationId xmlns:a16="http://schemas.microsoft.com/office/drawing/2014/main" id="{E5C3F240-17DB-8A46-9121-318C1A0E49B7}"/>
               </a:ext>
             </a:extLst>
           </p:cNvPr>
@@ -4273,15 +4585,7 @@
           <a:p>
             <a:r>
               <a:rPr lang="en-US" dirty="0"/>
-              <a:t>Tau and Gamma, </a:t>
-            </a:r>
-            <a:r>
-              <a:rPr lang="en-US" dirty="0" err="1"/>
-              <a:t>sd</a:t>
-            </a:r>
-            <a:r>
-              <a:rPr lang="en-US" dirty="0"/>
-              <a:t>=.25</a:t>
+              <a:t>Tau and Gamma, R0=2.5</a:t>
             </a:r>
           </a:p>
         </p:txBody>
@@ -4291,7 +4595,7 @@
           <p:cNvPr id="5" name="Content Placeholder 4">
             <a:extLst>
               <a:ext uri="{FF2B5EF4-FFF2-40B4-BE49-F238E27FC236}">
-                <a16:creationId xmlns:a16="http://schemas.microsoft.com/office/drawing/2014/main" id="{F8DB5FC4-3104-0248-9D4D-01F0667F335F}"/>
+                <a16:creationId xmlns:a16="http://schemas.microsoft.com/office/drawing/2014/main" id="{711C8C5C-CF87-EB40-A400-F06DD0912383}"/>
               </a:ext>
             </a:extLst>
           </p:cNvPr>
@@ -4310,15 +4614,15 @@
         </p:blipFill>
         <p:spPr>
           <a:xfrm>
-            <a:off x="2438400" y="2172494"/>
-            <a:ext cx="7315200" cy="3657600"/>
+            <a:off x="1981200" y="2172494"/>
+            <a:ext cx="8229600" cy="3657600"/>
           </a:xfrm>
         </p:spPr>
       </p:pic>
     </p:spTree>
     <p:extLst>
       <p:ext uri="{BB962C8B-B14F-4D97-AF65-F5344CB8AC3E}">
-        <p14:creationId xmlns:p14="http://schemas.microsoft.com/office/powerpoint/2010/main" val="2098288049"/>
+        <p14:creationId xmlns:p14="http://schemas.microsoft.com/office/powerpoint/2010/main" val="1152698738"/>
       </p:ext>
     </p:extLst>
   </p:cSld>
@@ -4350,7 +4654,7 @@
           <p:cNvPr id="2" name="Title 1">
             <a:extLst>
               <a:ext uri="{FF2B5EF4-FFF2-40B4-BE49-F238E27FC236}">
-                <a16:creationId xmlns:a16="http://schemas.microsoft.com/office/drawing/2014/main" id="{6C1A2952-A5FA-5549-89EF-183E45812BDC}"/>
+                <a16:creationId xmlns:a16="http://schemas.microsoft.com/office/drawing/2014/main" id="{96B29916-3379-F749-A031-F9A288F50AFB}"/>
               </a:ext>
             </a:extLst>
           </p:cNvPr>
@@ -4368,15 +4672,7 @@
           <a:p>
             <a:r>
               <a:rPr lang="en-US" dirty="0"/>
-              <a:t>Contact and Gamma, </a:t>
-            </a:r>
-            <a:r>
-              <a:rPr lang="en-US" dirty="0" err="1"/>
-              <a:t>sd</a:t>
-            </a:r>
-            <a:r>
-              <a:rPr lang="en-US" dirty="0"/>
-              <a:t>=.1</a:t>
+              <a:t>Tau and Gamma, R0=3.5</a:t>
             </a:r>
           </a:p>
         </p:txBody>
@@ -4386,7 +4682,7 @@
           <p:cNvPr id="5" name="Content Placeholder 4">
             <a:extLst>
               <a:ext uri="{FF2B5EF4-FFF2-40B4-BE49-F238E27FC236}">
-                <a16:creationId xmlns:a16="http://schemas.microsoft.com/office/drawing/2014/main" id="{9D1B62E3-8248-C947-A459-0F7A8C78E62E}"/>
+                <a16:creationId xmlns:a16="http://schemas.microsoft.com/office/drawing/2014/main" id="{55910A68-DAEE-E74E-B8F4-375E67D087BC}"/>
               </a:ext>
             </a:extLst>
           </p:cNvPr>
@@ -4405,15 +4701,15 @@
         </p:blipFill>
         <p:spPr>
           <a:xfrm>
-            <a:off x="2438400" y="2172494"/>
-            <a:ext cx="7315200" cy="3657600"/>
+            <a:off x="1981200" y="2172494"/>
+            <a:ext cx="8229600" cy="3657600"/>
           </a:xfrm>
         </p:spPr>
       </p:pic>
     </p:spTree>
     <p:extLst>
       <p:ext uri="{BB962C8B-B14F-4D97-AF65-F5344CB8AC3E}">
-        <p14:creationId xmlns:p14="http://schemas.microsoft.com/office/powerpoint/2010/main" val="62535895"/>
+        <p14:creationId xmlns:p14="http://schemas.microsoft.com/office/powerpoint/2010/main" val="2505997034"/>
       </p:ext>
     </p:extLst>
   </p:cSld>
@@ -4445,7 +4741,7 @@
           <p:cNvPr id="2" name="Title 1">
             <a:extLst>
               <a:ext uri="{FF2B5EF4-FFF2-40B4-BE49-F238E27FC236}">
-                <a16:creationId xmlns:a16="http://schemas.microsoft.com/office/drawing/2014/main" id="{83F9DE33-2FED-024E-A3FE-548A3F17F7F6}"/>
+                <a16:creationId xmlns:a16="http://schemas.microsoft.com/office/drawing/2014/main" id="{C16BE008-3716-3343-AAD9-A38063A79BB1}"/>
               </a:ext>
             </a:extLst>
           </p:cNvPr>
@@ -4463,15 +4759,7 @@
           <a:p>
             <a:r>
               <a:rPr lang="en-US" dirty="0"/>
-              <a:t>Contact and Gamma, </a:t>
-            </a:r>
-            <a:r>
-              <a:rPr lang="en-US" dirty="0" err="1"/>
-              <a:t>sd</a:t>
-            </a:r>
-            <a:r>
-              <a:rPr lang="en-US" dirty="0"/>
-              <a:t>=.25</a:t>
+              <a:t>Contact and gamma, R0=1.3</a:t>
             </a:r>
           </a:p>
         </p:txBody>
@@ -4481,7 +4769,7 @@
           <p:cNvPr id="5" name="Content Placeholder 4">
             <a:extLst>
               <a:ext uri="{FF2B5EF4-FFF2-40B4-BE49-F238E27FC236}">
-                <a16:creationId xmlns:a16="http://schemas.microsoft.com/office/drawing/2014/main" id="{5DE29B99-A9C8-4942-BE49-CF07DA19EDE3}"/>
+                <a16:creationId xmlns:a16="http://schemas.microsoft.com/office/drawing/2014/main" id="{25ABE1E7-F254-CA46-AA58-026CB69FFFC9}"/>
               </a:ext>
             </a:extLst>
           </p:cNvPr>
@@ -4500,15 +4788,15 @@
         </p:blipFill>
         <p:spPr>
           <a:xfrm>
-            <a:off x="2438400" y="2172494"/>
-            <a:ext cx="7315200" cy="3657600"/>
+            <a:off x="1981200" y="2172494"/>
+            <a:ext cx="8229600" cy="3657600"/>
           </a:xfrm>
         </p:spPr>
       </p:pic>
     </p:spTree>
     <p:extLst>
       <p:ext uri="{BB962C8B-B14F-4D97-AF65-F5344CB8AC3E}">
-        <p14:creationId xmlns:p14="http://schemas.microsoft.com/office/powerpoint/2010/main" val="218015827"/>
+        <p14:creationId xmlns:p14="http://schemas.microsoft.com/office/powerpoint/2010/main" val="4291892327"/>
       </p:ext>
     </p:extLst>
   </p:cSld>
@@ -4540,7 +4828,7 @@
           <p:cNvPr id="2" name="Title 1">
             <a:extLst>
               <a:ext uri="{FF2B5EF4-FFF2-40B4-BE49-F238E27FC236}">
-                <a16:creationId xmlns:a16="http://schemas.microsoft.com/office/drawing/2014/main" id="{B82F45BF-398D-DD4D-94FC-15A4F2A792A2}"/>
+                <a16:creationId xmlns:a16="http://schemas.microsoft.com/office/drawing/2014/main" id="{B30A423E-A765-A548-99BC-3A1038A4C52A}"/>
               </a:ext>
             </a:extLst>
           </p:cNvPr>
@@ -4558,15 +4846,7 @@
           <a:p>
             <a:r>
               <a:rPr lang="en-US" dirty="0"/>
-              <a:t>Contact and Alpha, </a:t>
-            </a:r>
-            <a:r>
-              <a:rPr lang="en-US" dirty="0" err="1"/>
-              <a:t>sd</a:t>
-            </a:r>
-            <a:r>
-              <a:rPr lang="en-US" dirty="0"/>
-              <a:t>=.1</a:t>
+              <a:t>Contact and gamma, R0=2.5</a:t>
             </a:r>
           </a:p>
         </p:txBody>
@@ -4576,7 +4856,7 @@
           <p:cNvPr id="5" name="Content Placeholder 4">
             <a:extLst>
               <a:ext uri="{FF2B5EF4-FFF2-40B4-BE49-F238E27FC236}">
-                <a16:creationId xmlns:a16="http://schemas.microsoft.com/office/drawing/2014/main" id="{1602D743-56A4-D143-B54C-D31BABCB069B}"/>
+                <a16:creationId xmlns:a16="http://schemas.microsoft.com/office/drawing/2014/main" id="{E7F9A291-E027-154E-A040-BF1AC55276E4}"/>
               </a:ext>
             </a:extLst>
           </p:cNvPr>
@@ -4595,15 +4875,15 @@
         </p:blipFill>
         <p:spPr>
           <a:xfrm>
-            <a:off x="2438400" y="2172494"/>
-            <a:ext cx="7315200" cy="3657600"/>
+            <a:off x="1981200" y="2172494"/>
+            <a:ext cx="8229600" cy="3657600"/>
           </a:xfrm>
         </p:spPr>
       </p:pic>
     </p:spTree>
     <p:extLst>
       <p:ext uri="{BB962C8B-B14F-4D97-AF65-F5344CB8AC3E}">
-        <p14:creationId xmlns:p14="http://schemas.microsoft.com/office/powerpoint/2010/main" val="1781462152"/>
+        <p14:creationId xmlns:p14="http://schemas.microsoft.com/office/powerpoint/2010/main" val="2388783752"/>
       </p:ext>
     </p:extLst>
   </p:cSld>
@@ -4635,7 +4915,7 @@
           <p:cNvPr id="2" name="Title 1">
             <a:extLst>
               <a:ext uri="{FF2B5EF4-FFF2-40B4-BE49-F238E27FC236}">
-                <a16:creationId xmlns:a16="http://schemas.microsoft.com/office/drawing/2014/main" id="{D8B05F7E-4B27-3048-AB37-652C341D8CE7}"/>
+                <a16:creationId xmlns:a16="http://schemas.microsoft.com/office/drawing/2014/main" id="{A4BFB192-802F-8440-9359-D6100BBBD569}"/>
               </a:ext>
             </a:extLst>
           </p:cNvPr>
@@ -4653,15 +4933,7 @@
           <a:p>
             <a:r>
               <a:rPr lang="en-US" dirty="0"/>
-              <a:t>Contact and Alpha, </a:t>
-            </a:r>
-            <a:r>
-              <a:rPr lang="en-US" dirty="0" err="1"/>
-              <a:t>sd</a:t>
-            </a:r>
-            <a:r>
-              <a:rPr lang="en-US" dirty="0"/>
-              <a:t>=.25</a:t>
+              <a:t>Contact and gamma, R0=3.5</a:t>
             </a:r>
           </a:p>
         </p:txBody>
@@ -4671,7 +4943,7 @@
           <p:cNvPr id="5" name="Content Placeholder 4">
             <a:extLst>
               <a:ext uri="{FF2B5EF4-FFF2-40B4-BE49-F238E27FC236}">
-                <a16:creationId xmlns:a16="http://schemas.microsoft.com/office/drawing/2014/main" id="{95BCA9F1-50A7-5D41-86E7-14E573DD2A28}"/>
+                <a16:creationId xmlns:a16="http://schemas.microsoft.com/office/drawing/2014/main" id="{76CE2A1E-BA53-AB45-993C-F1A665C140EC}"/>
               </a:ext>
             </a:extLst>
           </p:cNvPr>
@@ -4690,15 +4962,15 @@
         </p:blipFill>
         <p:spPr>
           <a:xfrm>
-            <a:off x="2438400" y="2172494"/>
-            <a:ext cx="7315200" cy="3657600"/>
+            <a:off x="1981200" y="2172494"/>
+            <a:ext cx="8229600" cy="3657600"/>
           </a:xfrm>
         </p:spPr>
       </p:pic>
     </p:spTree>
     <p:extLst>
       <p:ext uri="{BB962C8B-B14F-4D97-AF65-F5344CB8AC3E}">
-        <p14:creationId xmlns:p14="http://schemas.microsoft.com/office/powerpoint/2010/main" val="1042392510"/>
+        <p14:creationId xmlns:p14="http://schemas.microsoft.com/office/powerpoint/2010/main" val="38936866"/>
       </p:ext>
     </p:extLst>
   </p:cSld>

</xml_diff>

<commit_message>
updated plots on pp
</commit_message>
<xml_diff>
--- a/someplotz.pptx
+++ b/someplotz.pptx
@@ -5,24 +5,18 @@
     <p:sldMasterId id="2147483648" r:id="rId1"/>
   </p:sldMasterIdLst>
   <p:notesMasterIdLst>
-    <p:notesMasterId r:id="rId17"/>
+    <p:notesMasterId r:id="rId11"/>
   </p:notesMasterIdLst>
   <p:sldIdLst>
     <p:sldId id="257" r:id="rId2"/>
-    <p:sldId id="262" r:id="rId3"/>
-    <p:sldId id="267" r:id="rId4"/>
-    <p:sldId id="259" r:id="rId5"/>
-    <p:sldId id="263" r:id="rId6"/>
-    <p:sldId id="268" r:id="rId7"/>
-    <p:sldId id="258" r:id="rId8"/>
-    <p:sldId id="264" r:id="rId9"/>
-    <p:sldId id="269" r:id="rId10"/>
-    <p:sldId id="260" r:id="rId11"/>
-    <p:sldId id="265" r:id="rId12"/>
-    <p:sldId id="270" r:id="rId13"/>
-    <p:sldId id="261" r:id="rId14"/>
-    <p:sldId id="266" r:id="rId15"/>
-    <p:sldId id="271" r:id="rId16"/>
+    <p:sldId id="260" r:id="rId3"/>
+    <p:sldId id="263" r:id="rId4"/>
+    <p:sldId id="258" r:id="rId5"/>
+    <p:sldId id="261" r:id="rId6"/>
+    <p:sldId id="264" r:id="rId7"/>
+    <p:sldId id="259" r:id="rId8"/>
+    <p:sldId id="262" r:id="rId9"/>
+    <p:sldId id="265" r:id="rId10"/>
   </p:sldIdLst>
   <p:sldSz cx="12192000" cy="6858000"/>
   <p:notesSz cx="6858000" cy="9144000"/>
@@ -3697,7 +3691,7 @@
           <p:cNvPr id="2" name="Title 1">
             <a:extLst>
               <a:ext uri="{FF2B5EF4-FFF2-40B4-BE49-F238E27FC236}">
-                <a16:creationId xmlns:a16="http://schemas.microsoft.com/office/drawing/2014/main" id="{707E95A5-FCA6-244F-A8CD-5BEE9555A01E}"/>
+                <a16:creationId xmlns:a16="http://schemas.microsoft.com/office/drawing/2014/main" id="{E4AA1EDD-D584-6A41-8980-78D5F3EF1C27}"/>
               </a:ext>
             </a:extLst>
           </p:cNvPr>
@@ -3715,7 +3709,7 @@
           <a:p>
             <a:r>
               <a:rPr lang="en-US" dirty="0"/>
-              <a:t>Tau and Alpha, R0=1.3</a:t>
+              <a:t>Tau and Alpha, baseline params R0=1.225</a:t>
             </a:r>
           </a:p>
         </p:txBody>
@@ -3725,7 +3719,7 @@
           <p:cNvPr id="5" name="Content Placeholder 4">
             <a:extLst>
               <a:ext uri="{FF2B5EF4-FFF2-40B4-BE49-F238E27FC236}">
-                <a16:creationId xmlns:a16="http://schemas.microsoft.com/office/drawing/2014/main" id="{ECB60DBF-380B-A74F-BC09-7759F34C0BD3}"/>
+                <a16:creationId xmlns:a16="http://schemas.microsoft.com/office/drawing/2014/main" id="{3CBA5176-AED6-6F42-87D0-FF96E5C80B9A}"/>
               </a:ext>
             </a:extLst>
           </p:cNvPr>
@@ -3752,529 +3746,7 @@
     </p:spTree>
     <p:extLst>
       <p:ext uri="{BB962C8B-B14F-4D97-AF65-F5344CB8AC3E}">
-        <p14:creationId xmlns:p14="http://schemas.microsoft.com/office/powerpoint/2010/main" val="1143181785"/>
-      </p:ext>
-    </p:extLst>
-  </p:cSld>
-  <p:clrMapOvr>
-    <a:masterClrMapping/>
-  </p:clrMapOvr>
-</p:sld>
-</file>
-
-<file path=ppt/slides/slide10.xml><?xml version="1.0" encoding="utf-8"?>
-<p:sld xmlns:a="http://schemas.openxmlformats.org/drawingml/2006/main" xmlns:r="http://schemas.openxmlformats.org/officeDocument/2006/relationships" xmlns:p="http://schemas.openxmlformats.org/presentationml/2006/main">
-  <p:cSld>
-    <p:spTree>
-      <p:nvGrpSpPr>
-        <p:cNvPr id="1" name=""/>
-        <p:cNvGrpSpPr/>
-        <p:nvPr/>
-      </p:nvGrpSpPr>
-      <p:grpSpPr>
-        <a:xfrm>
-          <a:off x="0" y="0"/>
-          <a:ext cx="0" cy="0"/>
-          <a:chOff x="0" y="0"/>
-          <a:chExt cx="0" cy="0"/>
-        </a:xfrm>
-      </p:grpSpPr>
-      <p:sp>
-        <p:nvSpPr>
-          <p:cNvPr id="2" name="Title 1">
-            <a:extLst>
-              <a:ext uri="{FF2B5EF4-FFF2-40B4-BE49-F238E27FC236}">
-                <a16:creationId xmlns:a16="http://schemas.microsoft.com/office/drawing/2014/main" id="{5B062E5D-5DCF-A845-BDDA-1B5FD395201F}"/>
-              </a:ext>
-            </a:extLst>
-          </p:cNvPr>
-          <p:cNvSpPr>
-            <a:spLocks noGrp="1"/>
-          </p:cNvSpPr>
-          <p:nvPr>
-            <p:ph type="title"/>
-          </p:nvPr>
-        </p:nvSpPr>
-        <p:spPr/>
-        <p:txBody>
-          <a:bodyPr/>
-          <a:lstStyle/>
-          <a:p>
-            <a:r>
-              <a:rPr lang="en-US" dirty="0"/>
-              <a:t>Contact and Alpha, R0=1.3</a:t>
-            </a:r>
-          </a:p>
-        </p:txBody>
-      </p:sp>
-      <p:pic>
-        <p:nvPicPr>
-          <p:cNvPr id="5" name="Content Placeholder 4">
-            <a:extLst>
-              <a:ext uri="{FF2B5EF4-FFF2-40B4-BE49-F238E27FC236}">
-                <a16:creationId xmlns:a16="http://schemas.microsoft.com/office/drawing/2014/main" id="{A25EF7D3-03CE-B248-A8FB-3AB2548A18C3}"/>
-              </a:ext>
-            </a:extLst>
-          </p:cNvPr>
-          <p:cNvPicPr>
-            <a:picLocks noGrp="1" noChangeAspect="1"/>
-          </p:cNvPicPr>
-          <p:nvPr>
-            <p:ph idx="1"/>
-          </p:nvPr>
-        </p:nvPicPr>
-        <p:blipFill>
-          <a:blip r:embed="rId2"/>
-          <a:stretch>
-            <a:fillRect/>
-          </a:stretch>
-        </p:blipFill>
-        <p:spPr>
-          <a:xfrm>
-            <a:off x="1981200" y="2172494"/>
-            <a:ext cx="8229600" cy="3657600"/>
-          </a:xfrm>
-        </p:spPr>
-      </p:pic>
-    </p:spTree>
-    <p:extLst>
-      <p:ext uri="{BB962C8B-B14F-4D97-AF65-F5344CB8AC3E}">
-        <p14:creationId xmlns:p14="http://schemas.microsoft.com/office/powerpoint/2010/main" val="3008140729"/>
-      </p:ext>
-    </p:extLst>
-  </p:cSld>
-  <p:clrMapOvr>
-    <a:masterClrMapping/>
-  </p:clrMapOvr>
-</p:sld>
-</file>
-
-<file path=ppt/slides/slide11.xml><?xml version="1.0" encoding="utf-8"?>
-<p:sld xmlns:a="http://schemas.openxmlformats.org/drawingml/2006/main" xmlns:r="http://schemas.openxmlformats.org/officeDocument/2006/relationships" xmlns:p="http://schemas.openxmlformats.org/presentationml/2006/main">
-  <p:cSld>
-    <p:spTree>
-      <p:nvGrpSpPr>
-        <p:cNvPr id="1" name=""/>
-        <p:cNvGrpSpPr/>
-        <p:nvPr/>
-      </p:nvGrpSpPr>
-      <p:grpSpPr>
-        <a:xfrm>
-          <a:off x="0" y="0"/>
-          <a:ext cx="0" cy="0"/>
-          <a:chOff x="0" y="0"/>
-          <a:chExt cx="0" cy="0"/>
-        </a:xfrm>
-      </p:grpSpPr>
-      <p:sp>
-        <p:nvSpPr>
-          <p:cNvPr id="2" name="Title 1">
-            <a:extLst>
-              <a:ext uri="{FF2B5EF4-FFF2-40B4-BE49-F238E27FC236}">
-                <a16:creationId xmlns:a16="http://schemas.microsoft.com/office/drawing/2014/main" id="{850218F6-0458-0843-8207-012624AF630A}"/>
-              </a:ext>
-            </a:extLst>
-          </p:cNvPr>
-          <p:cNvSpPr>
-            <a:spLocks noGrp="1"/>
-          </p:cNvSpPr>
-          <p:nvPr>
-            <p:ph type="title"/>
-          </p:nvPr>
-        </p:nvSpPr>
-        <p:spPr/>
-        <p:txBody>
-          <a:bodyPr/>
-          <a:lstStyle/>
-          <a:p>
-            <a:r>
-              <a:rPr lang="en-US" dirty="0"/>
-              <a:t>Contact and Alpha, R0=2.5</a:t>
-            </a:r>
-          </a:p>
-        </p:txBody>
-      </p:sp>
-      <p:pic>
-        <p:nvPicPr>
-          <p:cNvPr id="5" name="Content Placeholder 4">
-            <a:extLst>
-              <a:ext uri="{FF2B5EF4-FFF2-40B4-BE49-F238E27FC236}">
-                <a16:creationId xmlns:a16="http://schemas.microsoft.com/office/drawing/2014/main" id="{1D9E2604-DB20-8B47-92F0-B55D4367D621}"/>
-              </a:ext>
-            </a:extLst>
-          </p:cNvPr>
-          <p:cNvPicPr>
-            <a:picLocks noGrp="1" noChangeAspect="1"/>
-          </p:cNvPicPr>
-          <p:nvPr>
-            <p:ph idx="1"/>
-          </p:nvPr>
-        </p:nvPicPr>
-        <p:blipFill>
-          <a:blip r:embed="rId2"/>
-          <a:stretch>
-            <a:fillRect/>
-          </a:stretch>
-        </p:blipFill>
-        <p:spPr>
-          <a:xfrm>
-            <a:off x="1981200" y="2172494"/>
-            <a:ext cx="8229600" cy="3657600"/>
-          </a:xfrm>
-        </p:spPr>
-      </p:pic>
-    </p:spTree>
-    <p:extLst>
-      <p:ext uri="{BB962C8B-B14F-4D97-AF65-F5344CB8AC3E}">
-        <p14:creationId xmlns:p14="http://schemas.microsoft.com/office/powerpoint/2010/main" val="195478028"/>
-      </p:ext>
-    </p:extLst>
-  </p:cSld>
-  <p:clrMapOvr>
-    <a:masterClrMapping/>
-  </p:clrMapOvr>
-</p:sld>
-</file>
-
-<file path=ppt/slides/slide12.xml><?xml version="1.0" encoding="utf-8"?>
-<p:sld xmlns:a="http://schemas.openxmlformats.org/drawingml/2006/main" xmlns:r="http://schemas.openxmlformats.org/officeDocument/2006/relationships" xmlns:p="http://schemas.openxmlformats.org/presentationml/2006/main">
-  <p:cSld>
-    <p:spTree>
-      <p:nvGrpSpPr>
-        <p:cNvPr id="1" name=""/>
-        <p:cNvGrpSpPr/>
-        <p:nvPr/>
-      </p:nvGrpSpPr>
-      <p:grpSpPr>
-        <a:xfrm>
-          <a:off x="0" y="0"/>
-          <a:ext cx="0" cy="0"/>
-          <a:chOff x="0" y="0"/>
-          <a:chExt cx="0" cy="0"/>
-        </a:xfrm>
-      </p:grpSpPr>
-      <p:sp>
-        <p:nvSpPr>
-          <p:cNvPr id="2" name="Title 1">
-            <a:extLst>
-              <a:ext uri="{FF2B5EF4-FFF2-40B4-BE49-F238E27FC236}">
-                <a16:creationId xmlns:a16="http://schemas.microsoft.com/office/drawing/2014/main" id="{F3642E09-6EB3-2C40-9ED8-F6FBC2537FAA}"/>
-              </a:ext>
-            </a:extLst>
-          </p:cNvPr>
-          <p:cNvSpPr>
-            <a:spLocks noGrp="1"/>
-          </p:cNvSpPr>
-          <p:nvPr>
-            <p:ph type="title"/>
-          </p:nvPr>
-        </p:nvSpPr>
-        <p:spPr/>
-        <p:txBody>
-          <a:bodyPr/>
-          <a:lstStyle/>
-          <a:p>
-            <a:r>
-              <a:rPr lang="en-US" dirty="0"/>
-              <a:t>Contact and Alpha, R0=3.5</a:t>
-            </a:r>
-          </a:p>
-        </p:txBody>
-      </p:sp>
-      <p:pic>
-        <p:nvPicPr>
-          <p:cNvPr id="5" name="Content Placeholder 4">
-            <a:extLst>
-              <a:ext uri="{FF2B5EF4-FFF2-40B4-BE49-F238E27FC236}">
-                <a16:creationId xmlns:a16="http://schemas.microsoft.com/office/drawing/2014/main" id="{254E1A07-65A8-7C4A-82D1-E79204918209}"/>
-              </a:ext>
-            </a:extLst>
-          </p:cNvPr>
-          <p:cNvPicPr>
-            <a:picLocks noGrp="1" noChangeAspect="1"/>
-          </p:cNvPicPr>
-          <p:nvPr>
-            <p:ph idx="1"/>
-          </p:nvPr>
-        </p:nvPicPr>
-        <p:blipFill>
-          <a:blip r:embed="rId2"/>
-          <a:stretch>
-            <a:fillRect/>
-          </a:stretch>
-        </p:blipFill>
-        <p:spPr>
-          <a:xfrm>
-            <a:off x="1981200" y="2172494"/>
-            <a:ext cx="8229600" cy="3657600"/>
-          </a:xfrm>
-        </p:spPr>
-      </p:pic>
-    </p:spTree>
-    <p:extLst>
-      <p:ext uri="{BB962C8B-B14F-4D97-AF65-F5344CB8AC3E}">
-        <p14:creationId xmlns:p14="http://schemas.microsoft.com/office/powerpoint/2010/main" val="1806080107"/>
-      </p:ext>
-    </p:extLst>
-  </p:cSld>
-  <p:clrMapOvr>
-    <a:masterClrMapping/>
-  </p:clrMapOvr>
-</p:sld>
-</file>
-
-<file path=ppt/slides/slide13.xml><?xml version="1.0" encoding="utf-8"?>
-<p:sld xmlns:a="http://schemas.openxmlformats.org/drawingml/2006/main" xmlns:r="http://schemas.openxmlformats.org/officeDocument/2006/relationships" xmlns:p="http://schemas.openxmlformats.org/presentationml/2006/main">
-  <p:cSld>
-    <p:spTree>
-      <p:nvGrpSpPr>
-        <p:cNvPr id="1" name=""/>
-        <p:cNvGrpSpPr/>
-        <p:nvPr/>
-      </p:nvGrpSpPr>
-      <p:grpSpPr>
-        <a:xfrm>
-          <a:off x="0" y="0"/>
-          <a:ext cx="0" cy="0"/>
-          <a:chOff x="0" y="0"/>
-          <a:chExt cx="0" cy="0"/>
-        </a:xfrm>
-      </p:grpSpPr>
-      <p:sp>
-        <p:nvSpPr>
-          <p:cNvPr id="2" name="Title 1">
-            <a:extLst>
-              <a:ext uri="{FF2B5EF4-FFF2-40B4-BE49-F238E27FC236}">
-                <a16:creationId xmlns:a16="http://schemas.microsoft.com/office/drawing/2014/main" id="{124D5740-1292-2D41-9D6B-684E4F773D1A}"/>
-              </a:ext>
-            </a:extLst>
-          </p:cNvPr>
-          <p:cNvSpPr>
-            <a:spLocks noGrp="1"/>
-          </p:cNvSpPr>
-          <p:nvPr>
-            <p:ph type="title"/>
-          </p:nvPr>
-        </p:nvSpPr>
-        <p:spPr/>
-        <p:txBody>
-          <a:bodyPr/>
-          <a:lstStyle/>
-          <a:p>
-            <a:r>
-              <a:rPr lang="en-US" dirty="0"/>
-              <a:t>Contact and Tau, R0=1.3</a:t>
-            </a:r>
-          </a:p>
-        </p:txBody>
-      </p:sp>
-      <p:pic>
-        <p:nvPicPr>
-          <p:cNvPr id="5" name="Content Placeholder 4">
-            <a:extLst>
-              <a:ext uri="{FF2B5EF4-FFF2-40B4-BE49-F238E27FC236}">
-                <a16:creationId xmlns:a16="http://schemas.microsoft.com/office/drawing/2014/main" id="{CDCD91F9-BBC3-1347-9EC5-8E05807EB308}"/>
-              </a:ext>
-            </a:extLst>
-          </p:cNvPr>
-          <p:cNvPicPr>
-            <a:picLocks noGrp="1" noChangeAspect="1"/>
-          </p:cNvPicPr>
-          <p:nvPr>
-            <p:ph idx="1"/>
-          </p:nvPr>
-        </p:nvPicPr>
-        <p:blipFill>
-          <a:blip r:embed="rId2"/>
-          <a:stretch>
-            <a:fillRect/>
-          </a:stretch>
-        </p:blipFill>
-        <p:spPr>
-          <a:xfrm>
-            <a:off x="1981200" y="2172494"/>
-            <a:ext cx="8229600" cy="3657600"/>
-          </a:xfrm>
-        </p:spPr>
-      </p:pic>
-    </p:spTree>
-    <p:extLst>
-      <p:ext uri="{BB962C8B-B14F-4D97-AF65-F5344CB8AC3E}">
-        <p14:creationId xmlns:p14="http://schemas.microsoft.com/office/powerpoint/2010/main" val="372636392"/>
-      </p:ext>
-    </p:extLst>
-  </p:cSld>
-  <p:clrMapOvr>
-    <a:masterClrMapping/>
-  </p:clrMapOvr>
-</p:sld>
-</file>
-
-<file path=ppt/slides/slide14.xml><?xml version="1.0" encoding="utf-8"?>
-<p:sld xmlns:a="http://schemas.openxmlformats.org/drawingml/2006/main" xmlns:r="http://schemas.openxmlformats.org/officeDocument/2006/relationships" xmlns:p="http://schemas.openxmlformats.org/presentationml/2006/main">
-  <p:cSld>
-    <p:spTree>
-      <p:nvGrpSpPr>
-        <p:cNvPr id="1" name=""/>
-        <p:cNvGrpSpPr/>
-        <p:nvPr/>
-      </p:nvGrpSpPr>
-      <p:grpSpPr>
-        <a:xfrm>
-          <a:off x="0" y="0"/>
-          <a:ext cx="0" cy="0"/>
-          <a:chOff x="0" y="0"/>
-          <a:chExt cx="0" cy="0"/>
-        </a:xfrm>
-      </p:grpSpPr>
-      <p:sp>
-        <p:nvSpPr>
-          <p:cNvPr id="2" name="Title 1">
-            <a:extLst>
-              <a:ext uri="{FF2B5EF4-FFF2-40B4-BE49-F238E27FC236}">
-                <a16:creationId xmlns:a16="http://schemas.microsoft.com/office/drawing/2014/main" id="{BB9E55FF-0013-9647-85A2-A891AA7EA7D2}"/>
-              </a:ext>
-            </a:extLst>
-          </p:cNvPr>
-          <p:cNvSpPr>
-            <a:spLocks noGrp="1"/>
-          </p:cNvSpPr>
-          <p:nvPr>
-            <p:ph type="title"/>
-          </p:nvPr>
-        </p:nvSpPr>
-        <p:spPr/>
-        <p:txBody>
-          <a:bodyPr/>
-          <a:lstStyle/>
-          <a:p>
-            <a:r>
-              <a:rPr lang="en-US" dirty="0"/>
-              <a:t>Contact and Tau, R0=2.5</a:t>
-            </a:r>
-          </a:p>
-        </p:txBody>
-      </p:sp>
-      <p:pic>
-        <p:nvPicPr>
-          <p:cNvPr id="5" name="Content Placeholder 4">
-            <a:extLst>
-              <a:ext uri="{FF2B5EF4-FFF2-40B4-BE49-F238E27FC236}">
-                <a16:creationId xmlns:a16="http://schemas.microsoft.com/office/drawing/2014/main" id="{9873AB9E-2623-4D4E-893E-B7C58B0155F1}"/>
-              </a:ext>
-            </a:extLst>
-          </p:cNvPr>
-          <p:cNvPicPr>
-            <a:picLocks noGrp="1" noChangeAspect="1"/>
-          </p:cNvPicPr>
-          <p:nvPr>
-            <p:ph idx="1"/>
-          </p:nvPr>
-        </p:nvPicPr>
-        <p:blipFill>
-          <a:blip r:embed="rId2"/>
-          <a:stretch>
-            <a:fillRect/>
-          </a:stretch>
-        </p:blipFill>
-        <p:spPr>
-          <a:xfrm>
-            <a:off x="1981200" y="2172494"/>
-            <a:ext cx="8229600" cy="3657600"/>
-          </a:xfrm>
-        </p:spPr>
-      </p:pic>
-    </p:spTree>
-    <p:extLst>
-      <p:ext uri="{BB962C8B-B14F-4D97-AF65-F5344CB8AC3E}">
-        <p14:creationId xmlns:p14="http://schemas.microsoft.com/office/powerpoint/2010/main" val="718694865"/>
-      </p:ext>
-    </p:extLst>
-  </p:cSld>
-  <p:clrMapOvr>
-    <a:masterClrMapping/>
-  </p:clrMapOvr>
-</p:sld>
-</file>
-
-<file path=ppt/slides/slide15.xml><?xml version="1.0" encoding="utf-8"?>
-<p:sld xmlns:a="http://schemas.openxmlformats.org/drawingml/2006/main" xmlns:r="http://schemas.openxmlformats.org/officeDocument/2006/relationships" xmlns:p="http://schemas.openxmlformats.org/presentationml/2006/main">
-  <p:cSld>
-    <p:spTree>
-      <p:nvGrpSpPr>
-        <p:cNvPr id="1" name=""/>
-        <p:cNvGrpSpPr/>
-        <p:nvPr/>
-      </p:nvGrpSpPr>
-      <p:grpSpPr>
-        <a:xfrm>
-          <a:off x="0" y="0"/>
-          <a:ext cx="0" cy="0"/>
-          <a:chOff x="0" y="0"/>
-          <a:chExt cx="0" cy="0"/>
-        </a:xfrm>
-      </p:grpSpPr>
-      <p:sp>
-        <p:nvSpPr>
-          <p:cNvPr id="2" name="Title 1">
-            <a:extLst>
-              <a:ext uri="{FF2B5EF4-FFF2-40B4-BE49-F238E27FC236}">
-                <a16:creationId xmlns:a16="http://schemas.microsoft.com/office/drawing/2014/main" id="{117BF2D0-65F6-054D-B990-4605F9815252}"/>
-              </a:ext>
-            </a:extLst>
-          </p:cNvPr>
-          <p:cNvSpPr>
-            <a:spLocks noGrp="1"/>
-          </p:cNvSpPr>
-          <p:nvPr>
-            <p:ph type="title"/>
-          </p:nvPr>
-        </p:nvSpPr>
-        <p:spPr/>
-        <p:txBody>
-          <a:bodyPr/>
-          <a:lstStyle/>
-          <a:p>
-            <a:r>
-              <a:rPr lang="en-US" dirty="0"/>
-              <a:t>Contact and Tau, R0=3.5</a:t>
-            </a:r>
-          </a:p>
-        </p:txBody>
-      </p:sp>
-      <p:pic>
-        <p:nvPicPr>
-          <p:cNvPr id="5" name="Content Placeholder 4">
-            <a:extLst>
-              <a:ext uri="{FF2B5EF4-FFF2-40B4-BE49-F238E27FC236}">
-                <a16:creationId xmlns:a16="http://schemas.microsoft.com/office/drawing/2014/main" id="{12BC6280-F5CA-F74D-92C7-D92B5344FB8E}"/>
-              </a:ext>
-            </a:extLst>
-          </p:cNvPr>
-          <p:cNvPicPr>
-            <a:picLocks noGrp="1" noChangeAspect="1"/>
-          </p:cNvPicPr>
-          <p:nvPr>
-            <p:ph idx="1"/>
-          </p:nvPr>
-        </p:nvPicPr>
-        <p:blipFill>
-          <a:blip r:embed="rId2"/>
-          <a:stretch>
-            <a:fillRect/>
-          </a:stretch>
-        </p:blipFill>
-        <p:spPr>
-          <a:xfrm>
-            <a:off x="1981200" y="2172494"/>
-            <a:ext cx="8229600" cy="3657600"/>
-          </a:xfrm>
-        </p:spPr>
-      </p:pic>
-    </p:spTree>
-    <p:extLst>
-      <p:ext uri="{BB962C8B-B14F-4D97-AF65-F5344CB8AC3E}">
-        <p14:creationId xmlns:p14="http://schemas.microsoft.com/office/powerpoint/2010/main" val="3939406445"/>
+        <p14:creationId xmlns:p14="http://schemas.microsoft.com/office/powerpoint/2010/main" val="2988862207"/>
       </p:ext>
     </p:extLst>
   </p:cSld>
@@ -4306,7 +3778,7 @@
           <p:cNvPr id="2" name="Title 1">
             <a:extLst>
               <a:ext uri="{FF2B5EF4-FFF2-40B4-BE49-F238E27FC236}">
-                <a16:creationId xmlns:a16="http://schemas.microsoft.com/office/drawing/2014/main" id="{73425639-A69D-BE44-9B91-03CB6FCFD847}"/>
+                <a16:creationId xmlns:a16="http://schemas.microsoft.com/office/drawing/2014/main" id="{3E818DE3-737C-0341-A432-D496A535596A}"/>
               </a:ext>
             </a:extLst>
           </p:cNvPr>
@@ -4331,10 +3803,10 @@
       </p:sp>
       <p:pic>
         <p:nvPicPr>
-          <p:cNvPr id="9" name="Content Placeholder 8">
-            <a:extLst>
-              <a:ext uri="{FF2B5EF4-FFF2-40B4-BE49-F238E27FC236}">
-                <a16:creationId xmlns:a16="http://schemas.microsoft.com/office/drawing/2014/main" id="{2AAF9F94-369A-D643-B8E2-F27EF51F90E7}"/>
+          <p:cNvPr id="5" name="Content Placeholder 4">
+            <a:extLst>
+              <a:ext uri="{FF2B5EF4-FFF2-40B4-BE49-F238E27FC236}">
+                <a16:creationId xmlns:a16="http://schemas.microsoft.com/office/drawing/2014/main" id="{3453D6AB-B077-F947-8680-4585736ECE40}"/>
               </a:ext>
             </a:extLst>
           </p:cNvPr>
@@ -4361,7 +3833,7 @@
     </p:spTree>
     <p:extLst>
       <p:ext uri="{BB962C8B-B14F-4D97-AF65-F5344CB8AC3E}">
-        <p14:creationId xmlns:p14="http://schemas.microsoft.com/office/powerpoint/2010/main" val="2516940154"/>
+        <p14:creationId xmlns:p14="http://schemas.microsoft.com/office/powerpoint/2010/main" val="2350401675"/>
       </p:ext>
     </p:extLst>
   </p:cSld>
@@ -4393,7 +3865,7 @@
           <p:cNvPr id="2" name="Title 1">
             <a:extLst>
               <a:ext uri="{FF2B5EF4-FFF2-40B4-BE49-F238E27FC236}">
-                <a16:creationId xmlns:a16="http://schemas.microsoft.com/office/drawing/2014/main" id="{0D991640-2C93-7E41-B1E6-C1EB0E54E361}"/>
+                <a16:creationId xmlns:a16="http://schemas.microsoft.com/office/drawing/2014/main" id="{F1D3A1B2-5536-2642-A5B1-FA6F33041C22}"/>
               </a:ext>
             </a:extLst>
           </p:cNvPr>
@@ -4421,7 +3893,7 @@
           <p:cNvPr id="5" name="Content Placeholder 4">
             <a:extLst>
               <a:ext uri="{FF2B5EF4-FFF2-40B4-BE49-F238E27FC236}">
-                <a16:creationId xmlns:a16="http://schemas.microsoft.com/office/drawing/2014/main" id="{E3ECD071-C881-524D-BA81-45E033337914}"/>
+                <a16:creationId xmlns:a16="http://schemas.microsoft.com/office/drawing/2014/main" id="{A226CD61-6C27-0843-A4A2-E40087273E97}"/>
               </a:ext>
             </a:extLst>
           </p:cNvPr>
@@ -4448,7 +3920,7 @@
     </p:spTree>
     <p:extLst>
       <p:ext uri="{BB962C8B-B14F-4D97-AF65-F5344CB8AC3E}">
-        <p14:creationId xmlns:p14="http://schemas.microsoft.com/office/powerpoint/2010/main" val="3086886976"/>
+        <p14:creationId xmlns:p14="http://schemas.microsoft.com/office/powerpoint/2010/main" val="3033798304"/>
       </p:ext>
     </p:extLst>
   </p:cSld>
@@ -4480,7 +3952,7 @@
           <p:cNvPr id="2" name="Title 1">
             <a:extLst>
               <a:ext uri="{FF2B5EF4-FFF2-40B4-BE49-F238E27FC236}">
-                <a16:creationId xmlns:a16="http://schemas.microsoft.com/office/drawing/2014/main" id="{6A6E7F02-87E1-2B45-B7A2-00E14078A407}"/>
+                <a16:creationId xmlns:a16="http://schemas.microsoft.com/office/drawing/2014/main" id="{330E86EB-E502-5B41-AD22-4C14DBC29526}"/>
               </a:ext>
             </a:extLst>
           </p:cNvPr>
@@ -4498,7 +3970,7 @@
           <a:p>
             <a:r>
               <a:rPr lang="en-US" dirty="0"/>
-              <a:t>Tau and Gamma, R0=1.3</a:t>
+              <a:t>Contact and Alpha, baseline params, R0=1.225</a:t>
             </a:r>
           </a:p>
         </p:txBody>
@@ -4508,7 +3980,7 @@
           <p:cNvPr id="5" name="Content Placeholder 4">
             <a:extLst>
               <a:ext uri="{FF2B5EF4-FFF2-40B4-BE49-F238E27FC236}">
-                <a16:creationId xmlns:a16="http://schemas.microsoft.com/office/drawing/2014/main" id="{83C41838-B624-6C49-9272-D7A45B159B72}"/>
+                <a16:creationId xmlns:a16="http://schemas.microsoft.com/office/drawing/2014/main" id="{984EA8E0-D782-5F49-B0B8-D656C536C6E5}"/>
               </a:ext>
             </a:extLst>
           </p:cNvPr>
@@ -4535,7 +4007,7 @@
     </p:spTree>
     <p:extLst>
       <p:ext uri="{BB962C8B-B14F-4D97-AF65-F5344CB8AC3E}">
-        <p14:creationId xmlns:p14="http://schemas.microsoft.com/office/powerpoint/2010/main" val="4218143306"/>
+        <p14:creationId xmlns:p14="http://schemas.microsoft.com/office/powerpoint/2010/main" val="399813823"/>
       </p:ext>
     </p:extLst>
   </p:cSld>
@@ -4567,7 +4039,7 @@
           <p:cNvPr id="2" name="Title 1">
             <a:extLst>
               <a:ext uri="{FF2B5EF4-FFF2-40B4-BE49-F238E27FC236}">
-                <a16:creationId xmlns:a16="http://schemas.microsoft.com/office/drawing/2014/main" id="{E5C3F240-17DB-8A46-9121-318C1A0E49B7}"/>
+                <a16:creationId xmlns:a16="http://schemas.microsoft.com/office/drawing/2014/main" id="{59762447-6CD5-354B-8AC5-5C6CD1D1A30C}"/>
               </a:ext>
             </a:extLst>
           </p:cNvPr>
@@ -4585,7 +4057,7 @@
           <a:p>
             <a:r>
               <a:rPr lang="en-US" dirty="0"/>
-              <a:t>Tau and Gamma, R0=2.5</a:t>
+              <a:t>Contact and Alpha, R0=2.5</a:t>
             </a:r>
           </a:p>
         </p:txBody>
@@ -4595,7 +4067,7 @@
           <p:cNvPr id="5" name="Content Placeholder 4">
             <a:extLst>
               <a:ext uri="{FF2B5EF4-FFF2-40B4-BE49-F238E27FC236}">
-                <a16:creationId xmlns:a16="http://schemas.microsoft.com/office/drawing/2014/main" id="{711C8C5C-CF87-EB40-A400-F06DD0912383}"/>
+                <a16:creationId xmlns:a16="http://schemas.microsoft.com/office/drawing/2014/main" id="{D3BB7C54-9193-6F44-BA6A-7CBAE4D0648A}"/>
               </a:ext>
             </a:extLst>
           </p:cNvPr>
@@ -4622,7 +4094,7 @@
     </p:spTree>
     <p:extLst>
       <p:ext uri="{BB962C8B-B14F-4D97-AF65-F5344CB8AC3E}">
-        <p14:creationId xmlns:p14="http://schemas.microsoft.com/office/powerpoint/2010/main" val="1152698738"/>
+        <p14:creationId xmlns:p14="http://schemas.microsoft.com/office/powerpoint/2010/main" val="3553287221"/>
       </p:ext>
     </p:extLst>
   </p:cSld>
@@ -4654,7 +4126,7 @@
           <p:cNvPr id="2" name="Title 1">
             <a:extLst>
               <a:ext uri="{FF2B5EF4-FFF2-40B4-BE49-F238E27FC236}">
-                <a16:creationId xmlns:a16="http://schemas.microsoft.com/office/drawing/2014/main" id="{96B29916-3379-F749-A031-F9A288F50AFB}"/>
+                <a16:creationId xmlns:a16="http://schemas.microsoft.com/office/drawing/2014/main" id="{0E34177E-C632-3946-A1C3-10578E868DCA}"/>
               </a:ext>
             </a:extLst>
           </p:cNvPr>
@@ -4672,7 +4144,7 @@
           <a:p>
             <a:r>
               <a:rPr lang="en-US" dirty="0"/>
-              <a:t>Tau and Gamma, R0=3.5</a:t>
+              <a:t>Contact and Alpha, R0=3.5</a:t>
             </a:r>
           </a:p>
         </p:txBody>
@@ -4682,7 +4154,7 @@
           <p:cNvPr id="5" name="Content Placeholder 4">
             <a:extLst>
               <a:ext uri="{FF2B5EF4-FFF2-40B4-BE49-F238E27FC236}">
-                <a16:creationId xmlns:a16="http://schemas.microsoft.com/office/drawing/2014/main" id="{55910A68-DAEE-E74E-B8F4-375E67D087BC}"/>
+                <a16:creationId xmlns:a16="http://schemas.microsoft.com/office/drawing/2014/main" id="{4854856C-91EF-BC47-8139-42C7A1AD9E84}"/>
               </a:ext>
             </a:extLst>
           </p:cNvPr>
@@ -4709,7 +4181,7 @@
     </p:spTree>
     <p:extLst>
       <p:ext uri="{BB962C8B-B14F-4D97-AF65-F5344CB8AC3E}">
-        <p14:creationId xmlns:p14="http://schemas.microsoft.com/office/powerpoint/2010/main" val="2505997034"/>
+        <p14:creationId xmlns:p14="http://schemas.microsoft.com/office/powerpoint/2010/main" val="1620691914"/>
       </p:ext>
     </p:extLst>
   </p:cSld>
@@ -4741,7 +4213,7 @@
           <p:cNvPr id="2" name="Title 1">
             <a:extLst>
               <a:ext uri="{FF2B5EF4-FFF2-40B4-BE49-F238E27FC236}">
-                <a16:creationId xmlns:a16="http://schemas.microsoft.com/office/drawing/2014/main" id="{C16BE008-3716-3343-AAD9-A38063A79BB1}"/>
+                <a16:creationId xmlns:a16="http://schemas.microsoft.com/office/drawing/2014/main" id="{E1C10631-17F6-B941-94C6-2867E704424D}"/>
               </a:ext>
             </a:extLst>
           </p:cNvPr>
@@ -4759,7 +4231,7 @@
           <a:p>
             <a:r>
               <a:rPr lang="en-US" dirty="0"/>
-              <a:t>Contact and gamma, R0=1.3</a:t>
+              <a:t>Contact and Tau, baseline params, R0=1.225</a:t>
             </a:r>
           </a:p>
         </p:txBody>
@@ -4769,7 +4241,7 @@
           <p:cNvPr id="5" name="Content Placeholder 4">
             <a:extLst>
               <a:ext uri="{FF2B5EF4-FFF2-40B4-BE49-F238E27FC236}">
-                <a16:creationId xmlns:a16="http://schemas.microsoft.com/office/drawing/2014/main" id="{25ABE1E7-F254-CA46-AA58-026CB69FFFC9}"/>
+                <a16:creationId xmlns:a16="http://schemas.microsoft.com/office/drawing/2014/main" id="{BA92DB1E-34D7-8F46-B070-CF2199D00059}"/>
               </a:ext>
             </a:extLst>
           </p:cNvPr>
@@ -4796,7 +4268,7 @@
     </p:spTree>
     <p:extLst>
       <p:ext uri="{BB962C8B-B14F-4D97-AF65-F5344CB8AC3E}">
-        <p14:creationId xmlns:p14="http://schemas.microsoft.com/office/powerpoint/2010/main" val="4291892327"/>
+        <p14:creationId xmlns:p14="http://schemas.microsoft.com/office/powerpoint/2010/main" val="451316916"/>
       </p:ext>
     </p:extLst>
   </p:cSld>
@@ -4828,7 +4300,7 @@
           <p:cNvPr id="2" name="Title 1">
             <a:extLst>
               <a:ext uri="{FF2B5EF4-FFF2-40B4-BE49-F238E27FC236}">
-                <a16:creationId xmlns:a16="http://schemas.microsoft.com/office/drawing/2014/main" id="{B30A423E-A765-A548-99BC-3A1038A4C52A}"/>
+                <a16:creationId xmlns:a16="http://schemas.microsoft.com/office/drawing/2014/main" id="{7B4FB4B6-6829-DA47-8A9F-8E7C3E2BD04C}"/>
               </a:ext>
             </a:extLst>
           </p:cNvPr>
@@ -4846,7 +4318,7 @@
           <a:p>
             <a:r>
               <a:rPr lang="en-US" dirty="0"/>
-              <a:t>Contact and gamma, R0=2.5</a:t>
+              <a:t>Contact and Tau, R0=2.5</a:t>
             </a:r>
           </a:p>
         </p:txBody>
@@ -4856,7 +4328,7 @@
           <p:cNvPr id="5" name="Content Placeholder 4">
             <a:extLst>
               <a:ext uri="{FF2B5EF4-FFF2-40B4-BE49-F238E27FC236}">
-                <a16:creationId xmlns:a16="http://schemas.microsoft.com/office/drawing/2014/main" id="{E7F9A291-E027-154E-A040-BF1AC55276E4}"/>
+                <a16:creationId xmlns:a16="http://schemas.microsoft.com/office/drawing/2014/main" id="{45D1D086-4236-BB42-A605-AB9792FA5F5E}"/>
               </a:ext>
             </a:extLst>
           </p:cNvPr>
@@ -4883,7 +4355,7 @@
     </p:spTree>
     <p:extLst>
       <p:ext uri="{BB962C8B-B14F-4D97-AF65-F5344CB8AC3E}">
-        <p14:creationId xmlns:p14="http://schemas.microsoft.com/office/powerpoint/2010/main" val="2388783752"/>
+        <p14:creationId xmlns:p14="http://schemas.microsoft.com/office/powerpoint/2010/main" val="3629612772"/>
       </p:ext>
     </p:extLst>
   </p:cSld>
@@ -4915,7 +4387,7 @@
           <p:cNvPr id="2" name="Title 1">
             <a:extLst>
               <a:ext uri="{FF2B5EF4-FFF2-40B4-BE49-F238E27FC236}">
-                <a16:creationId xmlns:a16="http://schemas.microsoft.com/office/drawing/2014/main" id="{A4BFB192-802F-8440-9359-D6100BBBD569}"/>
+                <a16:creationId xmlns:a16="http://schemas.microsoft.com/office/drawing/2014/main" id="{AC126DC8-4815-AC48-B0B5-D02B52275283}"/>
               </a:ext>
             </a:extLst>
           </p:cNvPr>
@@ -4933,7 +4405,7 @@
           <a:p>
             <a:r>
               <a:rPr lang="en-US" dirty="0"/>
-              <a:t>Contact and gamma, R0=3.5</a:t>
+              <a:t>Contact and Tau, R0=3.5</a:t>
             </a:r>
           </a:p>
         </p:txBody>
@@ -4943,7 +4415,7 @@
           <p:cNvPr id="5" name="Content Placeholder 4">
             <a:extLst>
               <a:ext uri="{FF2B5EF4-FFF2-40B4-BE49-F238E27FC236}">
-                <a16:creationId xmlns:a16="http://schemas.microsoft.com/office/drawing/2014/main" id="{76CE2A1E-BA53-AB45-993C-F1A665C140EC}"/>
+                <a16:creationId xmlns:a16="http://schemas.microsoft.com/office/drawing/2014/main" id="{7CC05B3F-073D-1A4D-A6EC-926EB6CEBEAA}"/>
               </a:ext>
             </a:extLst>
           </p:cNvPr>
@@ -4970,7 +4442,7 @@
     </p:spTree>
     <p:extLst>
       <p:ext uri="{BB962C8B-B14F-4D97-AF65-F5344CB8AC3E}">
-        <p14:creationId xmlns:p14="http://schemas.microsoft.com/office/powerpoint/2010/main" val="38936866"/>
+        <p14:creationId xmlns:p14="http://schemas.microsoft.com/office/powerpoint/2010/main" val="2998386494"/>
       </p:ext>
     </p:extLst>
   </p:cSld>

</xml_diff>